<commit_message>
Work on the intro protocol
</commit_message>
<xml_diff>
--- a/intro.labbench/Illustrations/Illustrations (Introduction to LabBench).pptx
+++ b/intro.labbench/Illustrations/Illustrations (Introduction to LabBench).pptx
@@ -217,7 +217,7 @@
           <a:p>
             <a:fld id="{2D646BAE-8E37-4DBA-A74E-0A3DD4A9F90C}" type="datetimeFigureOut">
               <a:rPr lang="en-DK" smtClean="0"/>
-              <a:t>31/12/2024</a:t>
+              <a:t>29/03/2025</a:t>
             </a:fld>
             <a:endParaRPr lang="en-DK"/>
           </a:p>
@@ -890,7 +890,7 @@
           <a:p>
             <a:fld id="{D4C52B10-47AD-4490-8483-919970C343B2}" type="datetimeFigureOut">
               <a:rPr lang="en-DK" smtClean="0"/>
-              <a:t>31/12/2024</a:t>
+              <a:t>29/03/2025</a:t>
             </a:fld>
             <a:endParaRPr lang="en-DK"/>
           </a:p>
@@ -1090,7 +1090,7 @@
           <a:p>
             <a:fld id="{D4C52B10-47AD-4490-8483-919970C343B2}" type="datetimeFigureOut">
               <a:rPr lang="en-DK" smtClean="0"/>
-              <a:t>31/12/2024</a:t>
+              <a:t>29/03/2025</a:t>
             </a:fld>
             <a:endParaRPr lang="en-DK"/>
           </a:p>
@@ -1300,7 +1300,7 @@
           <a:p>
             <a:fld id="{D4C52B10-47AD-4490-8483-919970C343B2}" type="datetimeFigureOut">
               <a:rPr lang="en-DK" smtClean="0"/>
-              <a:t>31/12/2024</a:t>
+              <a:t>29/03/2025</a:t>
             </a:fld>
             <a:endParaRPr lang="en-DK"/>
           </a:p>
@@ -1500,7 +1500,7 @@
           <a:p>
             <a:fld id="{D4C52B10-47AD-4490-8483-919970C343B2}" type="datetimeFigureOut">
               <a:rPr lang="en-DK" smtClean="0"/>
-              <a:t>31/12/2024</a:t>
+              <a:t>29/03/2025</a:t>
             </a:fld>
             <a:endParaRPr lang="en-DK"/>
           </a:p>
@@ -1776,7 +1776,7 @@
           <a:p>
             <a:fld id="{D4C52B10-47AD-4490-8483-919970C343B2}" type="datetimeFigureOut">
               <a:rPr lang="en-DK" smtClean="0"/>
-              <a:t>31/12/2024</a:t>
+              <a:t>29/03/2025</a:t>
             </a:fld>
             <a:endParaRPr lang="en-DK"/>
           </a:p>
@@ -2044,7 +2044,7 @@
           <a:p>
             <a:fld id="{D4C52B10-47AD-4490-8483-919970C343B2}" type="datetimeFigureOut">
               <a:rPr lang="en-DK" smtClean="0"/>
-              <a:t>31/12/2024</a:t>
+              <a:t>29/03/2025</a:t>
             </a:fld>
             <a:endParaRPr lang="en-DK"/>
           </a:p>
@@ -2459,7 +2459,7 @@
           <a:p>
             <a:fld id="{D4C52B10-47AD-4490-8483-919970C343B2}" type="datetimeFigureOut">
               <a:rPr lang="en-DK" smtClean="0"/>
-              <a:t>31/12/2024</a:t>
+              <a:t>29/03/2025</a:t>
             </a:fld>
             <a:endParaRPr lang="en-DK"/>
           </a:p>
@@ -2601,7 +2601,7 @@
           <a:p>
             <a:fld id="{D4C52B10-47AD-4490-8483-919970C343B2}" type="datetimeFigureOut">
               <a:rPr lang="en-DK" smtClean="0"/>
-              <a:t>31/12/2024</a:t>
+              <a:t>29/03/2025</a:t>
             </a:fld>
             <a:endParaRPr lang="en-DK"/>
           </a:p>
@@ -2714,7 +2714,7 @@
           <a:p>
             <a:fld id="{D4C52B10-47AD-4490-8483-919970C343B2}" type="datetimeFigureOut">
               <a:rPr lang="en-DK" smtClean="0"/>
-              <a:t>31/12/2024</a:t>
+              <a:t>29/03/2025</a:t>
             </a:fld>
             <a:endParaRPr lang="en-DK"/>
           </a:p>
@@ -3027,7 +3027,7 @@
           <a:p>
             <a:fld id="{D4C52B10-47AD-4490-8483-919970C343B2}" type="datetimeFigureOut">
               <a:rPr lang="en-DK" smtClean="0"/>
-              <a:t>31/12/2024</a:t>
+              <a:t>29/03/2025</a:t>
             </a:fld>
             <a:endParaRPr lang="en-DK"/>
           </a:p>
@@ -3316,7 +3316,7 @@
           <a:p>
             <a:fld id="{D4C52B10-47AD-4490-8483-919970C343B2}" type="datetimeFigureOut">
               <a:rPr lang="en-DK" smtClean="0"/>
-              <a:t>31/12/2024</a:t>
+              <a:t>29/03/2025</a:t>
             </a:fld>
             <a:endParaRPr lang="en-DK"/>
           </a:p>
@@ -3559,7 +3559,7 @@
           <a:p>
             <a:fld id="{D4C52B10-47AD-4490-8483-919970C343B2}" type="datetimeFigureOut">
               <a:rPr lang="en-DK" smtClean="0"/>
-              <a:t>31/12/2024</a:t>
+              <a:t>29/03/2025</a:t>
             </a:fld>
             <a:endParaRPr lang="en-DK"/>
           </a:p>
@@ -7075,7 +7075,7 @@
           <a:p>
             <a:r>
               <a:rPr lang="en-GB" dirty="0"/>
-              <a:t>Test information and control</a:t>
+              <a:t>Test control and information</a:t>
             </a:r>
             <a:endParaRPr lang="en-DK" dirty="0"/>
           </a:p>
@@ -8897,6 +8897,140 @@
           </a:ln>
         </p:spPr>
       </p:pic>
+      <p:sp>
+        <p:nvSpPr>
+          <p:cNvPr id="2" name="Rectangle 1">
+            <a:extLst>
+              <a:ext uri="{FF2B5EF4-FFF2-40B4-BE49-F238E27FC236}">
+                <a16:creationId xmlns:a16="http://schemas.microsoft.com/office/drawing/2014/main" id="{82E0F893-B3C3-6F8C-851E-25D2435BF3CB}"/>
+              </a:ext>
+            </a:extLst>
+          </p:cNvPr>
+          <p:cNvSpPr/>
+          <p:nvPr/>
+        </p:nvSpPr>
+        <p:spPr>
+          <a:xfrm>
+            <a:off x="2130169" y="4380613"/>
+            <a:ext cx="5749153" cy="290597"/>
+          </a:xfrm>
+          <a:prstGeom prst="rect">
+            <a:avLst/>
+          </a:prstGeom>
+          <a:noFill/>
+          <a:ln w="28575">
+            <a:solidFill>
+              <a:srgbClr val="FF0000">
+                <a:alpha val="25098"/>
+              </a:srgbClr>
+            </a:solidFill>
+            <a:prstDash val="sysDash"/>
+          </a:ln>
+        </p:spPr>
+        <p:style>
+          <a:lnRef idx="2">
+            <a:schemeClr val="accent1">
+              <a:shade val="15000"/>
+            </a:schemeClr>
+          </a:lnRef>
+          <a:fillRef idx="1">
+            <a:schemeClr val="accent1"/>
+          </a:fillRef>
+          <a:effectRef idx="0">
+            <a:schemeClr val="accent1"/>
+          </a:effectRef>
+          <a:fontRef idx="minor">
+            <a:schemeClr val="lt1"/>
+          </a:fontRef>
+        </p:style>
+        <p:txBody>
+          <a:bodyPr rtlCol="0" anchor="ctr"/>
+          <a:lstStyle/>
+          <a:p>
+            <a:pPr algn="ctr"/>
+            <a:endParaRPr lang="en-DK"/>
+          </a:p>
+        </p:txBody>
+      </p:sp>
+      <p:sp>
+        <p:nvSpPr>
+          <p:cNvPr id="4" name="TextBox 3">
+            <a:extLst>
+              <a:ext uri="{FF2B5EF4-FFF2-40B4-BE49-F238E27FC236}">
+                <a16:creationId xmlns:a16="http://schemas.microsoft.com/office/drawing/2014/main" id="{7E042ABF-31C8-BA80-13BB-6AFB89407304}"/>
+              </a:ext>
+            </a:extLst>
+          </p:cNvPr>
+          <p:cNvSpPr txBox="1"/>
+          <p:nvPr/>
+        </p:nvSpPr>
+        <p:spPr>
+          <a:xfrm>
+            <a:off x="5606900" y="4755663"/>
+            <a:ext cx="2226059" cy="369332"/>
+          </a:xfrm>
+          <a:prstGeom prst="rect">
+            <a:avLst/>
+          </a:prstGeom>
+          <a:noFill/>
+        </p:spPr>
+        <p:txBody>
+          <a:bodyPr wrap="none" rtlCol="0">
+            <a:spAutoFit/>
+          </a:bodyPr>
+          <a:lstStyle/>
+          <a:p>
+            <a:r>
+              <a:rPr lang="en-GB" dirty="0"/>
+              <a:t>Manual test controls</a:t>
+            </a:r>
+            <a:endParaRPr lang="en-DK" dirty="0"/>
+          </a:p>
+        </p:txBody>
+      </p:sp>
+      <p:cxnSp>
+        <p:nvCxnSpPr>
+          <p:cNvPr id="5" name="Connector: Elbow 4">
+            <a:extLst>
+              <a:ext uri="{FF2B5EF4-FFF2-40B4-BE49-F238E27FC236}">
+                <a16:creationId xmlns:a16="http://schemas.microsoft.com/office/drawing/2014/main" id="{B37AF7C9-738D-7D77-F12C-6B84BAF44C69}"/>
+              </a:ext>
+            </a:extLst>
+          </p:cNvPr>
+          <p:cNvCxnSpPr>
+            <a:cxnSpLocks/>
+            <a:stCxn id="4" idx="1"/>
+            <a:endCxn id="2" idx="2"/>
+          </p:cNvCxnSpPr>
+          <p:nvPr/>
+        </p:nvCxnSpPr>
+        <p:spPr>
+          <a:xfrm rot="10800000">
+            <a:off x="5004746" y="4671211"/>
+            <a:ext cx="602154" cy="269119"/>
+          </a:xfrm>
+          <a:prstGeom prst="bentConnector2">
+            <a:avLst/>
+          </a:prstGeom>
+          <a:ln>
+            <a:tailEnd type="triangle"/>
+          </a:ln>
+        </p:spPr>
+        <p:style>
+          <a:lnRef idx="2">
+            <a:schemeClr val="dk1"/>
+          </a:lnRef>
+          <a:fillRef idx="0">
+            <a:schemeClr val="dk1"/>
+          </a:fillRef>
+          <a:effectRef idx="1">
+            <a:schemeClr val="dk1"/>
+          </a:effectRef>
+          <a:fontRef idx="minor">
+            <a:schemeClr val="tx1"/>
+          </a:fontRef>
+        </p:style>
+      </p:cxnSp>
     </p:spTree>
     <p:extLst>
       <p:ext uri="{BB962C8B-B14F-4D97-AF65-F5344CB8AC3E}">
@@ -10064,10 +10198,10 @@
       </p:grpSpPr>
       <p:pic>
         <p:nvPicPr>
-          <p:cNvPr id="3" name="Picture 2">
-            <a:extLst>
-              <a:ext uri="{FF2B5EF4-FFF2-40B4-BE49-F238E27FC236}">
-                <a16:creationId xmlns:a16="http://schemas.microsoft.com/office/drawing/2014/main" id="{E7CD7F46-E8EC-3BB7-A473-24FAE483305F}"/>
+          <p:cNvPr id="13" name="Picture 12">
+            <a:extLst>
+              <a:ext uri="{FF2B5EF4-FFF2-40B4-BE49-F238E27FC236}">
+                <a16:creationId xmlns:a16="http://schemas.microsoft.com/office/drawing/2014/main" id="{366E3D05-812C-3265-45DD-82E887021D38}"/>
               </a:ext>
             </a:extLst>
           </p:cNvPr>
@@ -10084,8 +10218,8 @@
         </p:blipFill>
         <p:spPr>
           <a:xfrm>
-            <a:off x="2488354" y="1801227"/>
-            <a:ext cx="7200000" cy="3249635"/>
+            <a:off x="2379459" y="1658465"/>
+            <a:ext cx="6909942" cy="3916990"/>
           </a:xfrm>
           <a:prstGeom prst="rect">
             <a:avLst/>
@@ -10106,7 +10240,7 @@
         </p:nvSpPr>
         <p:spPr>
           <a:xfrm>
-            <a:off x="7151820" y="1154429"/>
+            <a:off x="6737143" y="1037472"/>
             <a:ext cx="4617546" cy="461665"/>
           </a:xfrm>
           <a:prstGeom prst="rect">
@@ -10142,7 +10276,7 @@
         </p:nvSpPr>
         <p:spPr>
           <a:xfrm>
-            <a:off x="9346465" y="2144376"/>
+            <a:off x="8931788" y="2027419"/>
             <a:ext cx="252000" cy="252000"/>
           </a:xfrm>
           <a:prstGeom prst="ellipse">
@@ -10198,7 +10332,7 @@
         </p:nvCxnSpPr>
         <p:spPr>
           <a:xfrm>
-            <a:off x="9460593" y="1616094"/>
+            <a:off x="9045916" y="1499137"/>
             <a:ext cx="11872" cy="528282"/>
           </a:xfrm>
           <a:prstGeom prst="straightConnector1">
@@ -10240,7 +10374,7 @@
         </p:nvSpPr>
         <p:spPr>
           <a:xfrm>
-            <a:off x="262890" y="1154429"/>
+            <a:off x="262890" y="1037472"/>
             <a:ext cx="3560847" cy="461665"/>
           </a:xfrm>
           <a:prstGeom prst="rect">
@@ -10276,8 +10410,8 @@
         </p:nvSpPr>
         <p:spPr>
           <a:xfrm>
-            <a:off x="2496000" y="3055492"/>
-            <a:ext cx="592640" cy="561468"/>
+            <a:off x="2388961" y="3000269"/>
+            <a:ext cx="640918" cy="561468"/>
           </a:xfrm>
           <a:prstGeom prst="rect">
             <a:avLst/>
@@ -10324,6 +10458,7 @@
             </a:extLst>
           </p:cNvPr>
           <p:cNvCxnSpPr>
+            <a:cxnSpLocks/>
             <a:stCxn id="6" idx="2"/>
             <a:endCxn id="7" idx="1"/>
           </p:cNvCxnSpPr>
@@ -10331,8 +10466,8 @@
         </p:nvCxnSpPr>
         <p:spPr>
           <a:xfrm rot="16200000" flipH="1">
-            <a:off x="1409591" y="2249817"/>
-            <a:ext cx="1720132" cy="452686"/>
+            <a:off x="1325204" y="2217246"/>
+            <a:ext cx="1781866" cy="345647"/>
           </a:xfrm>
           <a:prstGeom prst="bentConnector2">
             <a:avLst/>
@@ -10373,8 +10508,8 @@
         </p:nvSpPr>
         <p:spPr>
           <a:xfrm>
-            <a:off x="1440628" y="5324148"/>
-            <a:ext cx="4569456" cy="461665"/>
+            <a:off x="1353402" y="454858"/>
+            <a:ext cx="5601085" cy="461665"/>
           </a:xfrm>
           <a:prstGeom prst="rect">
             <a:avLst/>
@@ -10389,7 +10524,7 @@
           <a:p>
             <a:r>
               <a:rPr lang="en-GB" sz="2400" dirty="0"/>
-              <a:t>Select the labbench.io repository</a:t>
+              <a:t>Select the LabBench Protocol Repository</a:t>
             </a:r>
             <a:endParaRPr lang="en-DK" sz="2400" dirty="0"/>
           </a:p>
@@ -10409,8 +10544,8 @@
         </p:nvSpPr>
         <p:spPr>
           <a:xfrm>
-            <a:off x="3096286" y="2447176"/>
-            <a:ext cx="1304264" cy="364604"/>
+            <a:off x="3036528" y="2340761"/>
+            <a:ext cx="2223930" cy="364604"/>
           </a:xfrm>
           <a:prstGeom prst="rect">
             <a:avLst/>
@@ -10458,15 +10593,15 @@
           </p:cNvPr>
           <p:cNvCxnSpPr>
             <a:cxnSpLocks/>
-            <a:stCxn id="9" idx="0"/>
-            <a:endCxn id="10" idx="2"/>
+            <a:stCxn id="9" idx="2"/>
+            <a:endCxn id="10" idx="0"/>
           </p:cNvCxnSpPr>
           <p:nvPr/>
         </p:nvCxnSpPr>
         <p:spPr>
-          <a:xfrm flipV="1">
-            <a:off x="3725356" y="2811780"/>
-            <a:ext cx="23062" cy="2512368"/>
+          <a:xfrm flipH="1">
+            <a:off x="4148493" y="916523"/>
+            <a:ext cx="5452" cy="1424238"/>
           </a:xfrm>
           <a:prstGeom prst="straightConnector1">
             <a:avLst/>
@@ -10507,8 +10642,8 @@
         </p:nvSpPr>
         <p:spPr>
           <a:xfrm>
-            <a:off x="4487770" y="2462416"/>
-            <a:ext cx="1545376" cy="486524"/>
+            <a:off x="3205180" y="2921659"/>
+            <a:ext cx="2132363" cy="486524"/>
           </a:xfrm>
           <a:prstGeom prst="rect">
             <a:avLst/>
@@ -10559,7 +10694,7 @@
         </p:nvSpPr>
         <p:spPr>
           <a:xfrm>
-            <a:off x="3029879" y="510462"/>
+            <a:off x="2043313" y="5791749"/>
             <a:ext cx="4461158" cy="461665"/>
           </a:xfrm>
           <a:prstGeom prst="rect">
@@ -10592,15 +10727,15 @@
           </p:cNvPr>
           <p:cNvCxnSpPr>
             <a:cxnSpLocks/>
-            <a:stCxn id="15" idx="2"/>
-            <a:endCxn id="14" idx="0"/>
+            <a:stCxn id="15" idx="0"/>
+            <a:endCxn id="14" idx="2"/>
           </p:cNvCxnSpPr>
           <p:nvPr/>
         </p:nvCxnSpPr>
         <p:spPr>
-          <a:xfrm>
-            <a:off x="5260458" y="972127"/>
-            <a:ext cx="0" cy="1490289"/>
+          <a:xfrm flipH="1" flipV="1">
+            <a:off x="4271362" y="3408183"/>
+            <a:ext cx="2530" cy="2383566"/>
           </a:xfrm>
           <a:prstGeom prst="straightConnector1">
             <a:avLst/>

</xml_diff>

<commit_message>
Work on introduction protocol
</commit_message>
<xml_diff>
--- a/intro.labbench/Illustrations/Illustrations (Introduction to LabBench).pptx
+++ b/intro.labbench/Illustrations/Illustrations (Introduction to LabBench).pptx
@@ -217,7 +217,7 @@
           <a:p>
             <a:fld id="{2D646BAE-8E37-4DBA-A74E-0A3DD4A9F90C}" type="datetimeFigureOut">
               <a:rPr lang="en-DK" smtClean="0"/>
-              <a:t>29/03/2025</a:t>
+              <a:t>02/08/2025</a:t>
             </a:fld>
             <a:endParaRPr lang="en-DK"/>
           </a:p>
@@ -890,7 +890,7 @@
           <a:p>
             <a:fld id="{D4C52B10-47AD-4490-8483-919970C343B2}" type="datetimeFigureOut">
               <a:rPr lang="en-DK" smtClean="0"/>
-              <a:t>29/03/2025</a:t>
+              <a:t>02/08/2025</a:t>
             </a:fld>
             <a:endParaRPr lang="en-DK"/>
           </a:p>
@@ -1090,7 +1090,7 @@
           <a:p>
             <a:fld id="{D4C52B10-47AD-4490-8483-919970C343B2}" type="datetimeFigureOut">
               <a:rPr lang="en-DK" smtClean="0"/>
-              <a:t>29/03/2025</a:t>
+              <a:t>02/08/2025</a:t>
             </a:fld>
             <a:endParaRPr lang="en-DK"/>
           </a:p>
@@ -1300,7 +1300,7 @@
           <a:p>
             <a:fld id="{D4C52B10-47AD-4490-8483-919970C343B2}" type="datetimeFigureOut">
               <a:rPr lang="en-DK" smtClean="0"/>
-              <a:t>29/03/2025</a:t>
+              <a:t>02/08/2025</a:t>
             </a:fld>
             <a:endParaRPr lang="en-DK"/>
           </a:p>
@@ -1500,7 +1500,7 @@
           <a:p>
             <a:fld id="{D4C52B10-47AD-4490-8483-919970C343B2}" type="datetimeFigureOut">
               <a:rPr lang="en-DK" smtClean="0"/>
-              <a:t>29/03/2025</a:t>
+              <a:t>02/08/2025</a:t>
             </a:fld>
             <a:endParaRPr lang="en-DK"/>
           </a:p>
@@ -1776,7 +1776,7 @@
           <a:p>
             <a:fld id="{D4C52B10-47AD-4490-8483-919970C343B2}" type="datetimeFigureOut">
               <a:rPr lang="en-DK" smtClean="0"/>
-              <a:t>29/03/2025</a:t>
+              <a:t>02/08/2025</a:t>
             </a:fld>
             <a:endParaRPr lang="en-DK"/>
           </a:p>
@@ -2044,7 +2044,7 @@
           <a:p>
             <a:fld id="{D4C52B10-47AD-4490-8483-919970C343B2}" type="datetimeFigureOut">
               <a:rPr lang="en-DK" smtClean="0"/>
-              <a:t>29/03/2025</a:t>
+              <a:t>02/08/2025</a:t>
             </a:fld>
             <a:endParaRPr lang="en-DK"/>
           </a:p>
@@ -2459,7 +2459,7 @@
           <a:p>
             <a:fld id="{D4C52B10-47AD-4490-8483-919970C343B2}" type="datetimeFigureOut">
               <a:rPr lang="en-DK" smtClean="0"/>
-              <a:t>29/03/2025</a:t>
+              <a:t>02/08/2025</a:t>
             </a:fld>
             <a:endParaRPr lang="en-DK"/>
           </a:p>
@@ -2601,7 +2601,7 @@
           <a:p>
             <a:fld id="{D4C52B10-47AD-4490-8483-919970C343B2}" type="datetimeFigureOut">
               <a:rPr lang="en-DK" smtClean="0"/>
-              <a:t>29/03/2025</a:t>
+              <a:t>02/08/2025</a:t>
             </a:fld>
             <a:endParaRPr lang="en-DK"/>
           </a:p>
@@ -2714,7 +2714,7 @@
           <a:p>
             <a:fld id="{D4C52B10-47AD-4490-8483-919970C343B2}" type="datetimeFigureOut">
               <a:rPr lang="en-DK" smtClean="0"/>
-              <a:t>29/03/2025</a:t>
+              <a:t>02/08/2025</a:t>
             </a:fld>
             <a:endParaRPr lang="en-DK"/>
           </a:p>
@@ -3027,7 +3027,7 @@
           <a:p>
             <a:fld id="{D4C52B10-47AD-4490-8483-919970C343B2}" type="datetimeFigureOut">
               <a:rPr lang="en-DK" smtClean="0"/>
-              <a:t>29/03/2025</a:t>
+              <a:t>02/08/2025</a:t>
             </a:fld>
             <a:endParaRPr lang="en-DK"/>
           </a:p>
@@ -3316,7 +3316,7 @@
           <a:p>
             <a:fld id="{D4C52B10-47AD-4490-8483-919970C343B2}" type="datetimeFigureOut">
               <a:rPr lang="en-DK" smtClean="0"/>
-              <a:t>29/03/2025</a:t>
+              <a:t>02/08/2025</a:t>
             </a:fld>
             <a:endParaRPr lang="en-DK"/>
           </a:p>
@@ -3559,7 +3559,7 @@
           <a:p>
             <a:fld id="{D4C52B10-47AD-4490-8483-919970C343B2}" type="datetimeFigureOut">
               <a:rPr lang="en-DK" smtClean="0"/>
-              <a:t>29/03/2025</a:t>
+              <a:t>02/08/2025</a:t>
             </a:fld>
             <a:endParaRPr lang="en-DK"/>
           </a:p>
@@ -6597,8 +6597,8 @@
         </p:nvSpPr>
         <p:spPr>
           <a:xfrm>
-            <a:off x="2057102" y="3081801"/>
-            <a:ext cx="1957587" cy="369332"/>
+            <a:off x="2280389" y="3081801"/>
+            <a:ext cx="1587294" cy="369332"/>
           </a:xfrm>
           <a:prstGeom prst="rect">
             <a:avLst/>
@@ -6613,7 +6613,7 @@
           <a:p>
             <a:r>
               <a:rPr lang="en-GB" dirty="0"/>
-              <a:t>Is the it localized?</a:t>
+              <a:t>Is it localized?</a:t>
             </a:r>
             <a:endParaRPr lang="en-DK" dirty="0"/>
           </a:p>
@@ -11698,8 +11698,8 @@
         </p:nvSpPr>
         <p:spPr>
           <a:xfrm>
-            <a:off x="2092465" y="789777"/>
-            <a:ext cx="4377737" cy="461665"/>
+            <a:off x="2028667" y="789777"/>
+            <a:ext cx="4541243" cy="461665"/>
           </a:xfrm>
           <a:prstGeom prst="rect">
             <a:avLst/>
@@ -11714,7 +11714,7 @@
           <a:p>
             <a:r>
               <a:rPr lang="en-GB" sz="2400" dirty="0"/>
-              <a:t>Select the experiment to mange</a:t>
+              <a:t>Select the experiment to manage</a:t>
             </a:r>
             <a:endParaRPr lang="en-DK" sz="2400" dirty="0"/>
           </a:p>
@@ -11791,7 +11791,7 @@
         <p:spPr>
           <a:xfrm flipH="1">
             <a:off x="4270375" y="1251442"/>
-            <a:ext cx="10959" cy="976991"/>
+            <a:ext cx="28914" cy="976991"/>
           </a:xfrm>
           <a:prstGeom prst="straightConnector1">
             <a:avLst/>

</xml_diff>